<commit_message>
20240704_galaxy-api.pdf, 20240704_galaxy-api.pptx und 2 weitere dateien aktualisiert...
</commit_message>
<xml_diff>
--- a/talk/20240704_galaxy-api.pptx
+++ b/talk/20240704_galaxy-api.pptx
@@ -5,10 +5,10 @@
     <p:sldMasterId id="2147483648" r:id="rId1"/>
   </p:sldMasterIdLst>
   <p:notesMasterIdLst>
-    <p:notesMasterId r:id="rId11"/>
+    <p:notesMasterId r:id="rId12"/>
   </p:notesMasterIdLst>
   <p:handoutMasterIdLst>
-    <p:handoutMasterId r:id="rId12"/>
+    <p:handoutMasterId r:id="rId13"/>
   </p:handoutMasterIdLst>
   <p:sldIdLst>
     <p:sldId id="273" r:id="rId2"/>
@@ -20,6 +20,7 @@
     <p:sldId id="1177" r:id="rId8"/>
     <p:sldId id="1178" r:id="rId9"/>
     <p:sldId id="1179" r:id="rId10"/>
+    <p:sldId id="1180" r:id="rId11"/>
   </p:sldIdLst>
   <p:sldSz cx="12192000" cy="6858000"/>
   <p:notesSz cx="6858000" cy="9144000"/>
@@ -233,7 +234,7 @@
           <a:p>
             <a:fld id="{3DBDF0DE-9B2C-456A-81CE-ECB4922A2D02}" type="datetimeFigureOut">
               <a:rPr lang="de-DE" smtClean="0"/>
-              <a:t>03.07.2024</a:t>
+              <a:t>04.07.2024</a:t>
             </a:fld>
             <a:endParaRPr lang="de-DE"/>
           </a:p>
@@ -398,7 +399,7 @@
           <a:p>
             <a:fld id="{672A31F9-8E4B-4ED6-8272-3FF50063C297}" type="datetimeFigureOut">
               <a:rPr lang="de-DE" smtClean="0"/>
-              <a:t>03.07.2024</a:t>
+              <a:t>04.07.2024</a:t>
             </a:fld>
             <a:endParaRPr lang="de-DE"/>
           </a:p>
@@ -2003,6 +2004,380 @@
 </p:sld>
 </file>
 
+<file path=ppt/slides/slide10.xml><?xml version="1.0" encoding="utf-8"?>
+<p:sld xmlns:a="http://schemas.openxmlformats.org/drawingml/2006/main" xmlns:r="http://schemas.openxmlformats.org/officeDocument/2006/relationships" xmlns:p="http://schemas.openxmlformats.org/presentationml/2006/main">
+  <p:cSld>
+    <p:spTree>
+      <p:nvGrpSpPr>
+        <p:cNvPr id="1" name=""/>
+        <p:cNvGrpSpPr/>
+        <p:nvPr/>
+      </p:nvGrpSpPr>
+      <p:grpSpPr>
+        <a:xfrm>
+          <a:off x="0" y="0"/>
+          <a:ext cx="0" cy="0"/>
+          <a:chOff x="0" y="0"/>
+          <a:chExt cx="0" cy="0"/>
+        </a:xfrm>
+      </p:grpSpPr>
+      <p:sp>
+        <p:nvSpPr>
+          <p:cNvPr id="3" name="Textplatzhalter 2">
+            <a:extLst>
+              <a:ext uri="{FF2B5EF4-FFF2-40B4-BE49-F238E27FC236}">
+                <a16:creationId xmlns:a16="http://schemas.microsoft.com/office/drawing/2014/main" id="{E53959BB-0FE9-4A8E-A0CA-2ED897403CB1}"/>
+              </a:ext>
+            </a:extLst>
+          </p:cNvPr>
+          <p:cNvSpPr>
+            <a:spLocks noGrp="1"/>
+          </p:cNvSpPr>
+          <p:nvPr>
+            <p:ph type="body" sz="quarter" idx="13"/>
+          </p:nvPr>
+        </p:nvSpPr>
+        <p:spPr/>
+        <p:txBody>
+          <a:bodyPr/>
+          <a:lstStyle/>
+          <a:p>
+            <a:r>
+              <a:rPr lang="de-DE" sz="2400" b="1" dirty="0"/>
+              <a:t>More </a:t>
+            </a:r>
+            <a:r>
+              <a:rPr lang="de-DE" sz="2400" b="1" dirty="0" err="1"/>
+              <a:t>to</a:t>
+            </a:r>
+            <a:r>
+              <a:rPr lang="de-DE" sz="2400" b="1" dirty="0"/>
+              <a:t> </a:t>
+            </a:r>
+            <a:r>
+              <a:rPr lang="de-DE" sz="2400" b="1" dirty="0" err="1"/>
+              <a:t>read</a:t>
+            </a:r>
+            <a:endParaRPr lang="de-DE" sz="2400" b="1" dirty="0"/>
+          </a:p>
+          <a:p>
+            <a:endParaRPr lang="de-DE" dirty="0"/>
+          </a:p>
+        </p:txBody>
+      </p:sp>
+      <p:sp>
+        <p:nvSpPr>
+          <p:cNvPr id="5" name="Textplatzhalter 4">
+            <a:extLst>
+              <a:ext uri="{FF2B5EF4-FFF2-40B4-BE49-F238E27FC236}">
+                <a16:creationId xmlns:a16="http://schemas.microsoft.com/office/drawing/2014/main" id="{5A3D76A7-DEFB-4C11-B5A5-CFE9919E6B74}"/>
+              </a:ext>
+            </a:extLst>
+          </p:cNvPr>
+          <p:cNvSpPr>
+            <a:spLocks noGrp="1"/>
+          </p:cNvSpPr>
+          <p:nvPr>
+            <p:ph type="body" sz="quarter" idx="14"/>
+          </p:nvPr>
+        </p:nvSpPr>
+        <p:spPr/>
+        <p:txBody>
+          <a:bodyPr/>
+          <a:lstStyle/>
+          <a:p>
+            <a:r>
+              <a:rPr lang="en-US" dirty="0">
+                <a:latin typeface="+mn-lt"/>
+              </a:rPr>
+              <a:t>Connecting Galaxy – A short look &amp; tell</a:t>
+            </a:r>
+          </a:p>
+        </p:txBody>
+      </p:sp>
+      <p:sp>
+        <p:nvSpPr>
+          <p:cNvPr id="2" name="Textfeld 1">
+            <a:extLst>
+              <a:ext uri="{FF2B5EF4-FFF2-40B4-BE49-F238E27FC236}">
+                <a16:creationId xmlns:a16="http://schemas.microsoft.com/office/drawing/2014/main" id="{1DFE0176-91EE-18DA-5582-49ACC05508F8}"/>
+              </a:ext>
+            </a:extLst>
+          </p:cNvPr>
+          <p:cNvSpPr txBox="1"/>
+          <p:nvPr/>
+        </p:nvSpPr>
+        <p:spPr>
+          <a:xfrm>
+            <a:off x="622830" y="1340768"/>
+            <a:ext cx="9649634" cy="369332"/>
+          </a:xfrm>
+          <a:prstGeom prst="rect">
+            <a:avLst/>
+          </a:prstGeom>
+        </p:spPr>
+        <p:style>
+          <a:lnRef idx="2">
+            <a:schemeClr val="accent3">
+              <a:shade val="15000"/>
+            </a:schemeClr>
+          </a:lnRef>
+          <a:fillRef idx="1">
+            <a:schemeClr val="accent3"/>
+          </a:fillRef>
+          <a:effectRef idx="0">
+            <a:schemeClr val="accent3"/>
+          </a:effectRef>
+          <a:fontRef idx="minor">
+            <a:schemeClr val="lt1"/>
+          </a:fontRef>
+        </p:style>
+        <p:txBody>
+          <a:bodyPr wrap="square" rtlCol="0">
+            <a:spAutoFit/>
+          </a:bodyPr>
+          <a:lstStyle/>
+          <a:p>
+            <a:r>
+              <a:rPr lang="en-US" dirty="0">
+                <a:solidFill>
+                  <a:schemeClr val="tx1"/>
+                </a:solidFill>
+              </a:rPr>
+              <a:t>https://training.galaxyproject.org/training-material/topics/dev/tutorials/bioblend-api/slides.html</a:t>
+            </a:r>
+          </a:p>
+        </p:txBody>
+      </p:sp>
+      <p:sp>
+        <p:nvSpPr>
+          <p:cNvPr id="4" name="Textfeld 3">
+            <a:extLst>
+              <a:ext uri="{FF2B5EF4-FFF2-40B4-BE49-F238E27FC236}">
+                <a16:creationId xmlns:a16="http://schemas.microsoft.com/office/drawing/2014/main" id="{DD153CEC-44E1-8905-B23D-097B80CFBA74}"/>
+              </a:ext>
+            </a:extLst>
+          </p:cNvPr>
+          <p:cNvSpPr txBox="1"/>
+          <p:nvPr/>
+        </p:nvSpPr>
+        <p:spPr>
+          <a:xfrm>
+            <a:off x="622830" y="1957481"/>
+            <a:ext cx="9649634" cy="369332"/>
+          </a:xfrm>
+          <a:prstGeom prst="rect">
+            <a:avLst/>
+          </a:prstGeom>
+        </p:spPr>
+        <p:style>
+          <a:lnRef idx="2">
+            <a:schemeClr val="accent3">
+              <a:shade val="15000"/>
+            </a:schemeClr>
+          </a:lnRef>
+          <a:fillRef idx="1">
+            <a:schemeClr val="accent3"/>
+          </a:fillRef>
+          <a:effectRef idx="0">
+            <a:schemeClr val="accent3"/>
+          </a:effectRef>
+          <a:fontRef idx="minor">
+            <a:schemeClr val="lt1"/>
+          </a:fontRef>
+        </p:style>
+        <p:txBody>
+          <a:bodyPr wrap="square" rtlCol="0">
+            <a:spAutoFit/>
+          </a:bodyPr>
+          <a:lstStyle/>
+          <a:p>
+            <a:r>
+              <a:rPr lang="en-US" dirty="0">
+                <a:solidFill>
+                  <a:schemeClr val="tx1"/>
+                </a:solidFill>
+              </a:rPr>
+              <a:t>https://galaxyproject.org/</a:t>
+            </a:r>
+          </a:p>
+        </p:txBody>
+      </p:sp>
+      <p:sp>
+        <p:nvSpPr>
+          <p:cNvPr id="6" name="Textfeld 5">
+            <a:extLst>
+              <a:ext uri="{FF2B5EF4-FFF2-40B4-BE49-F238E27FC236}">
+                <a16:creationId xmlns:a16="http://schemas.microsoft.com/office/drawing/2014/main" id="{58011CFB-CF0E-53F3-3E9E-D4EB8993BFF0}"/>
+              </a:ext>
+            </a:extLst>
+          </p:cNvPr>
+          <p:cNvSpPr txBox="1"/>
+          <p:nvPr/>
+        </p:nvSpPr>
+        <p:spPr>
+          <a:xfrm>
+            <a:off x="622830" y="2574194"/>
+            <a:ext cx="9649634" cy="369332"/>
+          </a:xfrm>
+          <a:prstGeom prst="rect">
+            <a:avLst/>
+          </a:prstGeom>
+        </p:spPr>
+        <p:style>
+          <a:lnRef idx="2">
+            <a:schemeClr val="accent3">
+              <a:shade val="15000"/>
+            </a:schemeClr>
+          </a:lnRef>
+          <a:fillRef idx="1">
+            <a:schemeClr val="accent3"/>
+          </a:fillRef>
+          <a:effectRef idx="0">
+            <a:schemeClr val="accent3"/>
+          </a:effectRef>
+          <a:fontRef idx="minor">
+            <a:schemeClr val="lt1"/>
+          </a:fontRef>
+        </p:style>
+        <p:txBody>
+          <a:bodyPr wrap="square" rtlCol="0">
+            <a:spAutoFit/>
+          </a:bodyPr>
+          <a:lstStyle/>
+          <a:p>
+            <a:r>
+              <a:rPr lang="en-US" dirty="0">
+                <a:solidFill>
+                  <a:schemeClr val="tx1"/>
+                </a:solidFill>
+              </a:rPr>
+              <a:t>https://bioblend.readthedocs.io/en/latest/</a:t>
+            </a:r>
+          </a:p>
+        </p:txBody>
+      </p:sp>
+      <p:sp>
+        <p:nvSpPr>
+          <p:cNvPr id="7" name="Textfeld 6">
+            <a:extLst>
+              <a:ext uri="{FF2B5EF4-FFF2-40B4-BE49-F238E27FC236}">
+                <a16:creationId xmlns:a16="http://schemas.microsoft.com/office/drawing/2014/main" id="{7E67E236-A759-1490-2C01-83BD1E910872}"/>
+              </a:ext>
+            </a:extLst>
+          </p:cNvPr>
+          <p:cNvSpPr txBox="1"/>
+          <p:nvPr/>
+        </p:nvSpPr>
+        <p:spPr>
+          <a:xfrm>
+            <a:off x="628465" y="3190801"/>
+            <a:ext cx="9649634" cy="369332"/>
+          </a:xfrm>
+          <a:prstGeom prst="rect">
+            <a:avLst/>
+          </a:prstGeom>
+        </p:spPr>
+        <p:style>
+          <a:lnRef idx="2">
+            <a:schemeClr val="accent3">
+              <a:shade val="15000"/>
+            </a:schemeClr>
+          </a:lnRef>
+          <a:fillRef idx="1">
+            <a:schemeClr val="accent3"/>
+          </a:fillRef>
+          <a:effectRef idx="0">
+            <a:schemeClr val="accent3"/>
+          </a:effectRef>
+          <a:fontRef idx="minor">
+            <a:schemeClr val="lt1"/>
+          </a:fontRef>
+        </p:style>
+        <p:txBody>
+          <a:bodyPr wrap="square" rtlCol="0">
+            <a:spAutoFit/>
+          </a:bodyPr>
+          <a:lstStyle/>
+          <a:p>
+            <a:r>
+              <a:rPr lang="en-US" dirty="0">
+                <a:solidFill>
+                  <a:schemeClr val="tx1"/>
+                </a:solidFill>
+              </a:rPr>
+              <a:t>https://github.com/FabianMauz/ipb-talk-galaxy-api-20240704</a:t>
+            </a:r>
+          </a:p>
+        </p:txBody>
+      </p:sp>
+      <p:sp>
+        <p:nvSpPr>
+          <p:cNvPr id="8" name="Textfeld 7">
+            <a:extLst>
+              <a:ext uri="{FF2B5EF4-FFF2-40B4-BE49-F238E27FC236}">
+                <a16:creationId xmlns:a16="http://schemas.microsoft.com/office/drawing/2014/main" id="{18250F98-7387-9B82-AE1D-3E613CC76342}"/>
+              </a:ext>
+            </a:extLst>
+          </p:cNvPr>
+          <p:cNvSpPr txBox="1"/>
+          <p:nvPr/>
+        </p:nvSpPr>
+        <p:spPr>
+          <a:xfrm>
+            <a:off x="622830" y="3819917"/>
+            <a:ext cx="9649634" cy="369332"/>
+          </a:xfrm>
+          <a:prstGeom prst="rect">
+            <a:avLst/>
+          </a:prstGeom>
+        </p:spPr>
+        <p:style>
+          <a:lnRef idx="2">
+            <a:schemeClr val="accent3">
+              <a:shade val="15000"/>
+            </a:schemeClr>
+          </a:lnRef>
+          <a:fillRef idx="1">
+            <a:schemeClr val="accent3"/>
+          </a:fillRef>
+          <a:effectRef idx="0">
+            <a:schemeClr val="accent3"/>
+          </a:effectRef>
+          <a:fontRef idx="minor">
+            <a:schemeClr val="lt1"/>
+          </a:fontRef>
+        </p:style>
+        <p:txBody>
+          <a:bodyPr wrap="square" rtlCol="0">
+            <a:spAutoFit/>
+          </a:bodyPr>
+          <a:lstStyle/>
+          <a:p>
+            <a:r>
+              <a:rPr lang="en-US" dirty="0">
+                <a:solidFill>
+                  <a:schemeClr val="tx1"/>
+                </a:solidFill>
+              </a:rPr>
+              <a:t>https://github.com/galaxyproject/blend4j</a:t>
+            </a:r>
+          </a:p>
+        </p:txBody>
+      </p:sp>
+    </p:spTree>
+    <p:extLst>
+      <p:ext uri="{BB962C8B-B14F-4D97-AF65-F5344CB8AC3E}">
+        <p14:creationId xmlns:p14="http://schemas.microsoft.com/office/powerpoint/2010/main" val="2027414909"/>
+      </p:ext>
+    </p:extLst>
+  </p:cSld>
+  <p:clrMapOvr>
+    <a:masterClrMapping/>
+  </p:clrMapOvr>
+</p:sld>
+</file>
+
 <file path=ppt/slides/slide2.xml><?xml version="1.0" encoding="utf-8"?>
 <p:sld xmlns:a="http://schemas.openxmlformats.org/drawingml/2006/main" xmlns:r="http://schemas.openxmlformats.org/officeDocument/2006/relationships" xmlns:p="http://schemas.openxmlformats.org/presentationml/2006/main">
   <p:cSld>
@@ -2107,8 +2482,8 @@
         </p:nvSpPr>
         <p:spPr>
           <a:xfrm>
-            <a:off x="263352" y="1137050"/>
-            <a:ext cx="8208912" cy="369332"/>
+            <a:off x="263351" y="1137050"/>
+            <a:ext cx="9515991" cy="369332"/>
           </a:xfrm>
           <a:prstGeom prst="rect">
             <a:avLst/>
@@ -2336,7 +2711,7 @@
         <p:spPr>
           <a:xfrm>
             <a:off x="263352" y="1797428"/>
-            <a:ext cx="8208912" cy="369332"/>
+            <a:ext cx="9515990" cy="369332"/>
           </a:xfrm>
           <a:prstGeom prst="rect">
             <a:avLst/>
@@ -2418,7 +2793,7 @@
         </p:nvSpPr>
         <p:spPr>
           <a:xfrm>
-            <a:off x="263352" y="3244334"/>
+            <a:off x="2645082" y="3261424"/>
             <a:ext cx="4752528" cy="1477328"/>
           </a:xfrm>
           <a:prstGeom prst="rect">
@@ -2473,7 +2848,7 @@
                   <a:schemeClr val="tx1"/>
                 </a:solidFill>
               </a:rPr>
-              <a:t>   - </a:t>
+              <a:t>   -  </a:t>
             </a:r>
             <a:r>
               <a:rPr lang="de-DE" dirty="0">
@@ -4535,7 +4910,7 @@
         </p:blipFill>
         <p:spPr>
           <a:xfrm>
-            <a:off x="214406" y="1052736"/>
+            <a:off x="335360" y="1052736"/>
             <a:ext cx="7270314" cy="5184617"/>
           </a:xfrm>
           <a:prstGeom prst="rect">
@@ -4543,6 +4918,181 @@
           </a:prstGeom>
         </p:spPr>
       </p:pic>
+      <p:sp>
+        <p:nvSpPr>
+          <p:cNvPr id="2" name="Textfeld 1">
+            <a:extLst>
+              <a:ext uri="{FF2B5EF4-FFF2-40B4-BE49-F238E27FC236}">
+                <a16:creationId xmlns:a16="http://schemas.microsoft.com/office/drawing/2014/main" id="{E4017B9C-843E-EBAD-9FA7-CF7A6949EC08}"/>
+              </a:ext>
+            </a:extLst>
+          </p:cNvPr>
+          <p:cNvSpPr txBox="1"/>
+          <p:nvPr/>
+        </p:nvSpPr>
+        <p:spPr>
+          <a:xfrm>
+            <a:off x="7968208" y="1484784"/>
+            <a:ext cx="3960440" cy="369332"/>
+          </a:xfrm>
+          <a:prstGeom prst="rect">
+            <a:avLst/>
+          </a:prstGeom>
+        </p:spPr>
+        <p:style>
+          <a:lnRef idx="2">
+            <a:schemeClr val="accent3">
+              <a:shade val="15000"/>
+            </a:schemeClr>
+          </a:lnRef>
+          <a:fillRef idx="1">
+            <a:schemeClr val="accent3"/>
+          </a:fillRef>
+          <a:effectRef idx="0">
+            <a:schemeClr val="accent3"/>
+          </a:effectRef>
+          <a:fontRef idx="minor">
+            <a:schemeClr val="lt1"/>
+          </a:fontRef>
+        </p:style>
+        <p:txBody>
+          <a:bodyPr wrap="square" rtlCol="0">
+            <a:spAutoFit/>
+          </a:bodyPr>
+          <a:lstStyle/>
+          <a:p>
+            <a:r>
+              <a:rPr lang="en-US" dirty="0">
+                <a:solidFill>
+                  <a:schemeClr val="tx1"/>
+                </a:solidFill>
+              </a:rPr>
+              <a:t>3PA needs </a:t>
+            </a:r>
+            <a:r>
+              <a:rPr lang="en-US">
+                <a:solidFill>
+                  <a:schemeClr val="tx1"/>
+                </a:solidFill>
+              </a:rPr>
+              <a:t>to push and be pushed</a:t>
+            </a:r>
+            <a:endParaRPr lang="en-US" dirty="0">
+              <a:solidFill>
+                <a:schemeClr val="tx1"/>
+              </a:solidFill>
+            </a:endParaRPr>
+          </a:p>
+        </p:txBody>
+      </p:sp>
+      <p:sp>
+        <p:nvSpPr>
+          <p:cNvPr id="7" name="Textfeld 6">
+            <a:extLst>
+              <a:ext uri="{FF2B5EF4-FFF2-40B4-BE49-F238E27FC236}">
+                <a16:creationId xmlns:a16="http://schemas.microsoft.com/office/drawing/2014/main" id="{3A342DF5-33A9-F029-C371-4AD8B41D7584}"/>
+              </a:ext>
+            </a:extLst>
+          </p:cNvPr>
+          <p:cNvSpPr txBox="1"/>
+          <p:nvPr/>
+        </p:nvSpPr>
+        <p:spPr>
+          <a:xfrm>
+            <a:off x="7976074" y="2204864"/>
+            <a:ext cx="3952574" cy="369332"/>
+          </a:xfrm>
+          <a:prstGeom prst="rect">
+            <a:avLst/>
+          </a:prstGeom>
+        </p:spPr>
+        <p:style>
+          <a:lnRef idx="2">
+            <a:schemeClr val="accent3">
+              <a:shade val="15000"/>
+            </a:schemeClr>
+          </a:lnRef>
+          <a:fillRef idx="1">
+            <a:schemeClr val="accent3"/>
+          </a:fillRef>
+          <a:effectRef idx="0">
+            <a:schemeClr val="accent3"/>
+          </a:effectRef>
+          <a:fontRef idx="minor">
+            <a:schemeClr val="lt1"/>
+          </a:fontRef>
+        </p:style>
+        <p:txBody>
+          <a:bodyPr wrap="square" rtlCol="0">
+            <a:spAutoFit/>
+          </a:bodyPr>
+          <a:lstStyle/>
+          <a:p>
+            <a:r>
+              <a:rPr lang="en-US" dirty="0">
+                <a:solidFill>
+                  <a:schemeClr val="tx1"/>
+                </a:solidFill>
+              </a:rPr>
+              <a:t>3PA needs to have an ELN token of user</a:t>
+            </a:r>
+          </a:p>
+        </p:txBody>
+      </p:sp>
+      <p:sp>
+        <p:nvSpPr>
+          <p:cNvPr id="8" name="Textfeld 7">
+            <a:extLst>
+              <a:ext uri="{FF2B5EF4-FFF2-40B4-BE49-F238E27FC236}">
+                <a16:creationId xmlns:a16="http://schemas.microsoft.com/office/drawing/2014/main" id="{99CFDAD4-E620-CA0A-0F35-A30DA0348341}"/>
+              </a:ext>
+            </a:extLst>
+          </p:cNvPr>
+          <p:cNvSpPr txBox="1"/>
+          <p:nvPr/>
+        </p:nvSpPr>
+        <p:spPr>
+          <a:xfrm>
+            <a:off x="8000346" y="2924944"/>
+            <a:ext cx="3952574" cy="369332"/>
+          </a:xfrm>
+          <a:prstGeom prst="rect">
+            <a:avLst/>
+          </a:prstGeom>
+        </p:spPr>
+        <p:style>
+          <a:lnRef idx="2">
+            <a:schemeClr val="accent3">
+              <a:shade val="15000"/>
+            </a:schemeClr>
+          </a:lnRef>
+          <a:fillRef idx="1">
+            <a:schemeClr val="accent3"/>
+          </a:fillRef>
+          <a:effectRef idx="0">
+            <a:schemeClr val="accent3"/>
+          </a:effectRef>
+          <a:fontRef idx="minor">
+            <a:schemeClr val="lt1"/>
+          </a:fontRef>
+        </p:style>
+        <p:txBody>
+          <a:bodyPr wrap="square" rtlCol="0">
+            <a:spAutoFit/>
+          </a:bodyPr>
+          <a:lstStyle/>
+          <a:p>
+            <a:r>
+              <a:rPr lang="en-US" dirty="0">
+                <a:solidFill>
+                  <a:schemeClr val="tx1"/>
+                </a:solidFill>
+              </a:rPr>
+              <a:t>Communication based on ELN IDs</a:t>
+            </a:r>
+          </a:p>
+        </p:txBody>
+      </p:sp>
     </p:spTree>
     <p:extLst>
       <p:ext uri="{BB962C8B-B14F-4D97-AF65-F5344CB8AC3E}">
@@ -4651,6 +5201,342 @@
                 <a:latin typeface="+mn-lt"/>
               </a:rPr>
               <a:t>Connecting Galaxy – A short look &amp; tell</a:t>
+            </a:r>
+          </a:p>
+        </p:txBody>
+      </p:sp>
+      <p:sp>
+        <p:nvSpPr>
+          <p:cNvPr id="2" name="Textfeld 1">
+            <a:extLst>
+              <a:ext uri="{FF2B5EF4-FFF2-40B4-BE49-F238E27FC236}">
+                <a16:creationId xmlns:a16="http://schemas.microsoft.com/office/drawing/2014/main" id="{4D4F6588-8A37-C028-E0D5-D6726130CB05}"/>
+              </a:ext>
+            </a:extLst>
+          </p:cNvPr>
+          <p:cNvSpPr txBox="1"/>
+          <p:nvPr/>
+        </p:nvSpPr>
+        <p:spPr>
+          <a:xfrm>
+            <a:off x="580242" y="2467128"/>
+            <a:ext cx="6553290" cy="369332"/>
+          </a:xfrm>
+          <a:prstGeom prst="rect">
+            <a:avLst/>
+          </a:prstGeom>
+        </p:spPr>
+        <p:style>
+          <a:lnRef idx="2">
+            <a:schemeClr val="accent3">
+              <a:shade val="15000"/>
+            </a:schemeClr>
+          </a:lnRef>
+          <a:fillRef idx="1">
+            <a:schemeClr val="accent3"/>
+          </a:fillRef>
+          <a:effectRef idx="0">
+            <a:schemeClr val="accent3"/>
+          </a:effectRef>
+          <a:fontRef idx="minor">
+            <a:schemeClr val="lt1"/>
+          </a:fontRef>
+        </p:style>
+        <p:txBody>
+          <a:bodyPr wrap="square" rtlCol="0">
+            <a:spAutoFit/>
+          </a:bodyPr>
+          <a:lstStyle/>
+          <a:p>
+            <a:r>
+              <a:rPr lang="en-US" dirty="0">
+                <a:solidFill>
+                  <a:schemeClr val="tx1"/>
+                </a:solidFill>
+              </a:rPr>
+              <a:t>Supporting also workflows</a:t>
+            </a:r>
+          </a:p>
+        </p:txBody>
+      </p:sp>
+      <p:sp>
+        <p:nvSpPr>
+          <p:cNvPr id="4" name="Textfeld 3">
+            <a:extLst>
+              <a:ext uri="{FF2B5EF4-FFF2-40B4-BE49-F238E27FC236}">
+                <a16:creationId xmlns:a16="http://schemas.microsoft.com/office/drawing/2014/main" id="{950DA0BC-748C-97F6-3600-27D3F0190782}"/>
+              </a:ext>
+            </a:extLst>
+          </p:cNvPr>
+          <p:cNvSpPr txBox="1"/>
+          <p:nvPr/>
+        </p:nvSpPr>
+        <p:spPr>
+          <a:xfrm>
+            <a:off x="605257" y="3275693"/>
+            <a:ext cx="6553290" cy="369332"/>
+          </a:xfrm>
+          <a:prstGeom prst="rect">
+            <a:avLst/>
+          </a:prstGeom>
+        </p:spPr>
+        <p:style>
+          <a:lnRef idx="2">
+            <a:schemeClr val="accent3">
+              <a:shade val="15000"/>
+            </a:schemeClr>
+          </a:lnRef>
+          <a:fillRef idx="1">
+            <a:schemeClr val="accent3"/>
+          </a:fillRef>
+          <a:effectRef idx="0">
+            <a:schemeClr val="accent3"/>
+          </a:effectRef>
+          <a:fontRef idx="minor">
+            <a:schemeClr val="lt1"/>
+          </a:fontRef>
+        </p:style>
+        <p:txBody>
+          <a:bodyPr wrap="square" rtlCol="0">
+            <a:spAutoFit/>
+          </a:bodyPr>
+          <a:lstStyle/>
+          <a:p>
+            <a:r>
+              <a:rPr lang="en-US" dirty="0">
+                <a:solidFill>
+                  <a:schemeClr val="tx1"/>
+                </a:solidFill>
+              </a:rPr>
+              <a:t>How to handle the quota of a user</a:t>
+            </a:r>
+          </a:p>
+        </p:txBody>
+      </p:sp>
+      <p:sp>
+        <p:nvSpPr>
+          <p:cNvPr id="6" name="Textfeld 5">
+            <a:extLst>
+              <a:ext uri="{FF2B5EF4-FFF2-40B4-BE49-F238E27FC236}">
+                <a16:creationId xmlns:a16="http://schemas.microsoft.com/office/drawing/2014/main" id="{6131984A-3113-62BC-5B9B-70A3DE449B8F}"/>
+              </a:ext>
+            </a:extLst>
+          </p:cNvPr>
+          <p:cNvSpPr txBox="1"/>
+          <p:nvPr/>
+        </p:nvSpPr>
+        <p:spPr>
+          <a:xfrm>
+            <a:off x="605257" y="4077072"/>
+            <a:ext cx="6553290" cy="369332"/>
+          </a:xfrm>
+          <a:prstGeom prst="rect">
+            <a:avLst/>
+          </a:prstGeom>
+        </p:spPr>
+        <p:style>
+          <a:lnRef idx="2">
+            <a:schemeClr val="accent3">
+              <a:shade val="15000"/>
+            </a:schemeClr>
+          </a:lnRef>
+          <a:fillRef idx="1">
+            <a:schemeClr val="accent3"/>
+          </a:fillRef>
+          <a:effectRef idx="0">
+            <a:schemeClr val="accent3"/>
+          </a:effectRef>
+          <a:fontRef idx="minor">
+            <a:schemeClr val="lt1"/>
+          </a:fontRef>
+        </p:style>
+        <p:txBody>
+          <a:bodyPr wrap="square" rtlCol="0">
+            <a:spAutoFit/>
+          </a:bodyPr>
+          <a:lstStyle/>
+          <a:p>
+            <a:r>
+              <a:rPr lang="en-US" dirty="0" err="1">
+                <a:solidFill>
+                  <a:schemeClr val="tx1"/>
+                </a:solidFill>
+              </a:rPr>
+              <a:t>Chemotion</a:t>
+            </a:r>
+            <a:r>
+              <a:rPr lang="en-US" dirty="0">
+                <a:solidFill>
+                  <a:schemeClr val="tx1"/>
+                </a:solidFill>
+              </a:rPr>
+              <a:t> </a:t>
+            </a:r>
+            <a:r>
+              <a:rPr lang="en-US" dirty="0" err="1">
+                <a:solidFill>
+                  <a:schemeClr val="tx1"/>
+                </a:solidFill>
+              </a:rPr>
+              <a:t>eln</a:t>
+            </a:r>
+            <a:r>
+              <a:rPr lang="en-US" dirty="0">
+                <a:solidFill>
+                  <a:schemeClr val="tx1"/>
+                </a:solidFill>
+              </a:rPr>
+              <a:t>: create an own Galaxy Connector Third-party-app ?</a:t>
+            </a:r>
+          </a:p>
+        </p:txBody>
+      </p:sp>
+      <p:pic>
+        <p:nvPicPr>
+          <p:cNvPr id="10" name="Grafik 9">
+            <a:extLst>
+              <a:ext uri="{FF2B5EF4-FFF2-40B4-BE49-F238E27FC236}">
+                <a16:creationId xmlns:a16="http://schemas.microsoft.com/office/drawing/2014/main" id="{060D63D3-9463-5722-1415-7834DDDD6576}"/>
+              </a:ext>
+            </a:extLst>
+          </p:cNvPr>
+          <p:cNvPicPr>
+            <a:picLocks noChangeAspect="1"/>
+          </p:cNvPicPr>
+          <p:nvPr/>
+        </p:nvPicPr>
+        <p:blipFill>
+          <a:blip r:embed="rId2"/>
+          <a:stretch>
+            <a:fillRect/>
+          </a:stretch>
+        </p:blipFill>
+        <p:spPr>
+          <a:xfrm>
+            <a:off x="8040216" y="1224169"/>
+            <a:ext cx="3067050" cy="1695450"/>
+          </a:xfrm>
+          <a:prstGeom prst="rect">
+            <a:avLst/>
+          </a:prstGeom>
+          <a:solidFill>
+            <a:srgbClr val="FFFFFF">
+              <a:shade val="85000"/>
+            </a:srgbClr>
+          </a:solidFill>
+          <a:ln w="88900" cap="sq">
+            <a:solidFill>
+              <a:srgbClr val="FFFFFF"/>
+            </a:solidFill>
+            <a:miter lim="800000"/>
+          </a:ln>
+          <a:effectLst>
+            <a:outerShdw blurRad="55000" dist="18000" dir="5400000" algn="tl" rotWithShape="0">
+              <a:srgbClr val="000000">
+                <a:alpha val="40000"/>
+              </a:srgbClr>
+            </a:outerShdw>
+          </a:effectLst>
+          <a:scene3d>
+            <a:camera prst="orthographicFront"/>
+            <a:lightRig rig="twoPt" dir="t">
+              <a:rot lat="0" lon="0" rev="7200000"/>
+            </a:lightRig>
+          </a:scene3d>
+          <a:sp3d>
+            <a:bevelT w="25400" h="19050"/>
+            <a:contourClr>
+              <a:srgbClr val="FFFFFF"/>
+            </a:contourClr>
+          </a:sp3d>
+        </p:spPr>
+      </p:pic>
+      <p:pic>
+        <p:nvPicPr>
+          <p:cNvPr id="12" name="Grafik 11" descr="Ein Bild, das Text, Screenshot, Schrift, Zahl enthält.&#10;&#10;Automatisch generierte Beschreibung">
+            <a:extLst>
+              <a:ext uri="{FF2B5EF4-FFF2-40B4-BE49-F238E27FC236}">
+                <a16:creationId xmlns:a16="http://schemas.microsoft.com/office/drawing/2014/main" id="{F4740C42-2FAB-2F64-FED2-68A1088ABAD7}"/>
+              </a:ext>
+            </a:extLst>
+          </p:cNvPr>
+          <p:cNvPicPr>
+            <a:picLocks noChangeAspect="1"/>
+          </p:cNvPicPr>
+          <p:nvPr/>
+        </p:nvPicPr>
+        <p:blipFill>
+          <a:blip r:embed="rId3">
+            <a:extLst>
+              <a:ext uri="{28A0092B-C50C-407E-A947-70E740481C1C}">
+                <a14:useLocalDpi xmlns:a14="http://schemas.microsoft.com/office/drawing/2010/main" val="0"/>
+              </a:ext>
+            </a:extLst>
+          </a:blip>
+          <a:stretch>
+            <a:fillRect/>
+          </a:stretch>
+        </p:blipFill>
+        <p:spPr>
+          <a:xfrm>
+            <a:off x="7680176" y="3212976"/>
+            <a:ext cx="3878560" cy="2818016"/>
+          </a:xfrm>
+          <a:prstGeom prst="rect">
+            <a:avLst/>
+          </a:prstGeom>
+        </p:spPr>
+      </p:pic>
+      <p:sp>
+        <p:nvSpPr>
+          <p:cNvPr id="13" name="Textfeld 12">
+            <a:extLst>
+              <a:ext uri="{FF2B5EF4-FFF2-40B4-BE49-F238E27FC236}">
+                <a16:creationId xmlns:a16="http://schemas.microsoft.com/office/drawing/2014/main" id="{7551A467-AE21-A965-D752-E45F05D67BBA}"/>
+              </a:ext>
+            </a:extLst>
+          </p:cNvPr>
+          <p:cNvSpPr txBox="1"/>
+          <p:nvPr/>
+        </p:nvSpPr>
+        <p:spPr>
+          <a:xfrm>
+            <a:off x="575549" y="1633047"/>
+            <a:ext cx="6553290" cy="369332"/>
+          </a:xfrm>
+          <a:prstGeom prst="rect">
+            <a:avLst/>
+          </a:prstGeom>
+        </p:spPr>
+        <p:style>
+          <a:lnRef idx="2">
+            <a:schemeClr val="accent3">
+              <a:shade val="15000"/>
+            </a:schemeClr>
+          </a:lnRef>
+          <a:fillRef idx="1">
+            <a:schemeClr val="accent3"/>
+          </a:fillRef>
+          <a:effectRef idx="0">
+            <a:schemeClr val="accent3"/>
+          </a:effectRef>
+          <a:fontRef idx="minor">
+            <a:schemeClr val="lt1"/>
+          </a:fontRef>
+        </p:style>
+        <p:txBody>
+          <a:bodyPr wrap="square" rtlCol="0">
+            <a:spAutoFit/>
+          </a:bodyPr>
+          <a:lstStyle/>
+          <a:p>
+            <a:r>
+              <a:rPr lang="en-US" dirty="0">
+                <a:solidFill>
+                  <a:schemeClr val="tx1"/>
+                </a:solidFill>
+              </a:rPr>
+              <a:t>Fix problems with input parameters</a:t>
             </a:r>
           </a:p>
         </p:txBody>

</xml_diff>